<commit_message>
Started refactoring to new project name: myRailIO
</commit_message>
<xml_diff>
--- a/documentation/SystemDescription.pptx
+++ b/documentation/SystemDescription.pptx
@@ -125,14 +125,6 @@
 </p:presentation>
 </file>
 
-<file path=ppt/revisionInfo.xml><?xml version="1.0" encoding="utf-8"?>
-<p1510:revInfo xmlns:a="http://schemas.openxmlformats.org/drawingml/2006/main" xmlns:r="http://schemas.openxmlformats.org/officeDocument/2006/relationships" xmlns:p1510="http://schemas.microsoft.com/office/powerpoint/2015/10/main">
-  <p1510:revLst>
-    <p1510:client id="{2772AFDA-C8E1-4E23-A327-A7EBE8CBCCEA}" v="492" dt="2022-05-13T19:01:28.290"/>
-  </p1510:revLst>
-</p1510:revInfo>
-</file>
-
 <file path=ppt/changesInfos/changesInfo1.xml><?xml version="1.0" encoding="utf-8"?>
 <pc:chgInfo xmlns:a="http://schemas.openxmlformats.org/drawingml/2006/main" xmlns:r="http://schemas.openxmlformats.org/officeDocument/2006/relationships" xmlns:ac="http://schemas.microsoft.com/office/drawing/2013/main/command" xmlns:pc="http://schemas.microsoft.com/office/powerpoint/2013/main/command">
   <pc:docChgLst>
@@ -6783,6 +6775,70 @@
             <ac:cxnSpMk id="108" creationId="{0110DC6C-2794-4D34-9B29-088D0FE6279D}"/>
           </ac:cxnSpMkLst>
         </pc:cxnChg>
+      </pc:sldChg>
+    </pc:docChg>
+  </pc:docChgLst>
+  <pc:docChgLst>
+    <pc:chgData name="Jonas Bjurel" userId="6b799b81391c3a9b" providerId="LiveId" clId="{5F4E5738-D245-46CA-A94F-B2C6B1792654}"/>
+    <pc:docChg chg="custSel modSld">
+      <pc:chgData name="Jonas Bjurel" userId="6b799b81391c3a9b" providerId="LiveId" clId="{5F4E5738-D245-46CA-A94F-B2C6B1792654}" dt="2024-06-21T17:12:50.048" v="5" actId="313"/>
+      <pc:docMkLst>
+        <pc:docMk/>
+      </pc:docMkLst>
+      <pc:sldChg chg="modSp mod">
+        <pc:chgData name="Jonas Bjurel" userId="6b799b81391c3a9b" providerId="LiveId" clId="{5F4E5738-D245-46CA-A94F-B2C6B1792654}" dt="2024-06-21T17:12:50.048" v="5" actId="313"/>
+        <pc:sldMkLst>
+          <pc:docMk/>
+          <pc:sldMk cId="3939977221" sldId="258"/>
+        </pc:sldMkLst>
+        <pc:spChg chg="mod">
+          <ac:chgData name="Jonas Bjurel" userId="6b799b81391c3a9b" providerId="LiveId" clId="{5F4E5738-D245-46CA-A94F-B2C6B1792654}" dt="2024-06-21T17:12:09.959" v="0" actId="313"/>
+          <ac:spMkLst>
+            <pc:docMk/>
+            <pc:sldMk cId="3939977221" sldId="258"/>
+            <ac:spMk id="2" creationId="{BB9E4DB6-B291-45A3-81FF-07643E1B376D}"/>
+          </ac:spMkLst>
+        </pc:spChg>
+        <pc:spChg chg="mod">
+          <ac:chgData name="Jonas Bjurel" userId="6b799b81391c3a9b" providerId="LiveId" clId="{5F4E5738-D245-46CA-A94F-B2C6B1792654}" dt="2024-06-21T17:12:40.112" v="1" actId="313"/>
+          <ac:spMkLst>
+            <pc:docMk/>
+            <pc:sldMk cId="3939977221" sldId="258"/>
+            <ac:spMk id="5" creationId="{030A06BE-3096-41B5-BB3B-37F42037F7E8}"/>
+          </ac:spMkLst>
+        </pc:spChg>
+        <pc:spChg chg="mod">
+          <ac:chgData name="Jonas Bjurel" userId="6b799b81391c3a9b" providerId="LiveId" clId="{5F4E5738-D245-46CA-A94F-B2C6B1792654}" dt="2024-06-21T17:12:44.900" v="2" actId="313"/>
+          <ac:spMkLst>
+            <pc:docMk/>
+            <pc:sldMk cId="3939977221" sldId="258"/>
+            <ac:spMk id="12" creationId="{83A23DB0-57EF-49A6-BC40-F0B6219F9928}"/>
+          </ac:spMkLst>
+        </pc:spChg>
+        <pc:spChg chg="mod">
+          <ac:chgData name="Jonas Bjurel" userId="6b799b81391c3a9b" providerId="LiveId" clId="{5F4E5738-D245-46CA-A94F-B2C6B1792654}" dt="2024-06-21T17:12:46.283" v="3" actId="313"/>
+          <ac:spMkLst>
+            <pc:docMk/>
+            <pc:sldMk cId="3939977221" sldId="258"/>
+            <ac:spMk id="13" creationId="{38AD94C7-B371-4906-B3AA-7FEEB8DE84A8}"/>
+          </ac:spMkLst>
+        </pc:spChg>
+        <pc:spChg chg="mod">
+          <ac:chgData name="Jonas Bjurel" userId="6b799b81391c3a9b" providerId="LiveId" clId="{5F4E5738-D245-46CA-A94F-B2C6B1792654}" dt="2024-06-21T17:12:48.228" v="4" actId="313"/>
+          <ac:spMkLst>
+            <pc:docMk/>
+            <pc:sldMk cId="3939977221" sldId="258"/>
+            <ac:spMk id="19" creationId="{69706BEF-23E2-48F4-B728-F83DFAD6DCB2}"/>
+          </ac:spMkLst>
+        </pc:spChg>
+        <pc:spChg chg="mod">
+          <ac:chgData name="Jonas Bjurel" userId="6b799b81391c3a9b" providerId="LiveId" clId="{5F4E5738-D245-46CA-A94F-B2C6B1792654}" dt="2024-06-21T17:12:50.048" v="5" actId="313"/>
+          <ac:spMkLst>
+            <pc:docMk/>
+            <pc:sldMk cId="3939977221" sldId="258"/>
+            <ac:spMk id="72" creationId="{AE034879-1BA2-4CA3-BE5E-DF7753AC9673}"/>
+          </ac:spMkLst>
+        </pc:spChg>
       </pc:sldChg>
     </pc:docChg>
   </pc:docChgLst>
@@ -8447,7 +8503,7 @@
           <a:p>
             <a:fld id="{73DE9F94-ED67-4F14-8D38-53742644DD53}" type="datetimeFigureOut">
               <a:rPr lang="en-SE" smtClean="0"/>
-              <a:t>2022-05-07</a:t>
+              <a:t>2024-06-21</a:t>
             </a:fld>
             <a:endParaRPr lang="en-SE"/>
           </a:p>
@@ -8647,7 +8703,7 @@
           <a:p>
             <a:fld id="{73DE9F94-ED67-4F14-8D38-53742644DD53}" type="datetimeFigureOut">
               <a:rPr lang="en-SE" smtClean="0"/>
-              <a:t>2022-05-07</a:t>
+              <a:t>2024-06-21</a:t>
             </a:fld>
             <a:endParaRPr lang="en-SE"/>
           </a:p>
@@ -8857,7 +8913,7 @@
           <a:p>
             <a:fld id="{73DE9F94-ED67-4F14-8D38-53742644DD53}" type="datetimeFigureOut">
               <a:rPr lang="en-SE" smtClean="0"/>
-              <a:t>2022-05-07</a:t>
+              <a:t>2024-06-21</a:t>
             </a:fld>
             <a:endParaRPr lang="en-SE"/>
           </a:p>
@@ -9057,7 +9113,7 @@
           <a:p>
             <a:fld id="{73DE9F94-ED67-4F14-8D38-53742644DD53}" type="datetimeFigureOut">
               <a:rPr lang="en-SE" smtClean="0"/>
-              <a:t>2022-05-07</a:t>
+              <a:t>2024-06-21</a:t>
             </a:fld>
             <a:endParaRPr lang="en-SE"/>
           </a:p>
@@ -9333,7 +9389,7 @@
           <a:p>
             <a:fld id="{73DE9F94-ED67-4F14-8D38-53742644DD53}" type="datetimeFigureOut">
               <a:rPr lang="en-SE" smtClean="0"/>
-              <a:t>2022-05-07</a:t>
+              <a:t>2024-06-21</a:t>
             </a:fld>
             <a:endParaRPr lang="en-SE"/>
           </a:p>
@@ -9601,7 +9657,7 @@
           <a:p>
             <a:fld id="{73DE9F94-ED67-4F14-8D38-53742644DD53}" type="datetimeFigureOut">
               <a:rPr lang="en-SE" smtClean="0"/>
-              <a:t>2022-05-07</a:t>
+              <a:t>2024-06-21</a:t>
             </a:fld>
             <a:endParaRPr lang="en-SE"/>
           </a:p>
@@ -10016,7 +10072,7 @@
           <a:p>
             <a:fld id="{73DE9F94-ED67-4F14-8D38-53742644DD53}" type="datetimeFigureOut">
               <a:rPr lang="en-SE" smtClean="0"/>
-              <a:t>2022-05-07</a:t>
+              <a:t>2024-06-21</a:t>
             </a:fld>
             <a:endParaRPr lang="en-SE"/>
           </a:p>
@@ -10158,7 +10214,7 @@
           <a:p>
             <a:fld id="{73DE9F94-ED67-4F14-8D38-53742644DD53}" type="datetimeFigureOut">
               <a:rPr lang="en-SE" smtClean="0"/>
-              <a:t>2022-05-07</a:t>
+              <a:t>2024-06-21</a:t>
             </a:fld>
             <a:endParaRPr lang="en-SE"/>
           </a:p>
@@ -10271,7 +10327,7 @@
           <a:p>
             <a:fld id="{73DE9F94-ED67-4F14-8D38-53742644DD53}" type="datetimeFigureOut">
               <a:rPr lang="en-SE" smtClean="0"/>
-              <a:t>2022-05-07</a:t>
+              <a:t>2024-06-21</a:t>
             </a:fld>
             <a:endParaRPr lang="en-SE"/>
           </a:p>
@@ -10584,7 +10640,7 @@
           <a:p>
             <a:fld id="{73DE9F94-ED67-4F14-8D38-53742644DD53}" type="datetimeFigureOut">
               <a:rPr lang="en-SE" smtClean="0"/>
-              <a:t>2022-05-07</a:t>
+              <a:t>2024-06-21</a:t>
             </a:fld>
             <a:endParaRPr lang="en-SE"/>
           </a:p>
@@ -10873,7 +10929,7 @@
           <a:p>
             <a:fld id="{73DE9F94-ED67-4F14-8D38-53742644DD53}" type="datetimeFigureOut">
               <a:rPr lang="en-SE" smtClean="0"/>
-              <a:t>2022-05-07</a:t>
+              <a:t>2024-06-21</a:t>
             </a:fld>
             <a:endParaRPr lang="en-SE"/>
           </a:p>
@@ -11116,7 +11172,7 @@
           <a:p>
             <a:fld id="{73DE9F94-ED67-4F14-8D38-53742644DD53}" type="datetimeFigureOut">
               <a:rPr lang="en-SE" smtClean="0"/>
-              <a:t>2022-05-07</a:t>
+              <a:t>2024-06-21</a:t>
             </a:fld>
             <a:endParaRPr lang="en-SE"/>
           </a:p>
@@ -23836,7 +23892,7 @@
           <a:p>
             <a:r>
               <a:rPr lang="en-US" b="1" dirty="0" err="1"/>
-              <a:t>GenJMRI</a:t>
+              <a:t>myRailIO</a:t>
             </a:r>
             <a:r>
               <a:rPr lang="en-US" b="1" dirty="0"/>
@@ -23958,7 +24014,7 @@
                   <a:schemeClr val="tx1"/>
                 </a:solidFill>
               </a:rPr>
-              <a:t>GenJMRI</a:t>
+              <a:t>myRailIO</a:t>
             </a:r>
             <a:br>
               <a:rPr lang="en-US" sz="1600" dirty="0">
@@ -24089,7 +24145,7 @@
                   <a:schemeClr val="tx1"/>
                 </a:solidFill>
               </a:rPr>
-              <a:t>GenJMRI</a:t>
+              <a:t>myRailIO</a:t>
             </a:r>
             <a:br>
               <a:rPr lang="en-US" sz="1600" dirty="0">
@@ -24180,7 +24236,7 @@
                   <a:schemeClr val="tx1"/>
                 </a:solidFill>
               </a:rPr>
-              <a:t>GenJMRI</a:t>
+              <a:t>myRailIO</a:t>
             </a:r>
             <a:br>
               <a:rPr lang="en-US" sz="1600" dirty="0">
@@ -24386,7 +24442,7 @@
                   <a:schemeClr val="tx1"/>
                 </a:solidFill>
               </a:rPr>
-              <a:t>GenJMRI</a:t>
+              <a:t>myRailIO</a:t>
             </a:r>
             <a:r>
               <a:rPr lang="en-US" sz="1000" dirty="0">
@@ -26576,7 +26632,7 @@
                   <a:schemeClr val="tx1"/>
                 </a:solidFill>
               </a:rPr>
-              <a:t>genJMRI</a:t>
+              <a:t>myRailIO</a:t>
             </a:r>
             <a:r>
               <a:rPr lang="en-US" sz="1600" b="1" dirty="0">

</xml_diff>